<commit_message>
Added two newly implemented features in the presentation
</commit_message>
<xml_diff>
--- a/docs/wsdm.pptx
+++ b/docs/wsdm.pptx
@@ -29,16 +29,16 @@
   <p:notesSz cx="6858000" cy="9144000"/>
   <p:embeddedFontLst>
     <p:embeddedFont>
-      <p:font typeface="Montserrat" panose="020B0604020202020204" charset="0"/>
+      <p:font typeface="Karla" panose="020B0604020202020204" charset="0"/>
       <p:regular r:id="rId19"/>
       <p:bold r:id="rId20"/>
+      <p:italic r:id="rId21"/>
+      <p:boldItalic r:id="rId22"/>
     </p:embeddedFont>
     <p:embeddedFont>
-      <p:font typeface="Karla" panose="020B0604020202020204" charset="0"/>
-      <p:regular r:id="rId21"/>
-      <p:bold r:id="rId22"/>
-      <p:italic r:id="rId23"/>
-      <p:boldItalic r:id="rId24"/>
+      <p:font typeface="Montserrat" panose="020B0604020202020204" charset="0"/>
+      <p:regular r:id="rId23"/>
+      <p:bold r:id="rId24"/>
     </p:embeddedFont>
   </p:embeddedFontLst>
   <p:defaultTextStyle>
@@ -245,7 +245,7 @@
   </p:defaultTextStyle>
   <p:extLst>
     <p:ext uri="{EFAFB233-063F-42B5-8137-9DF3F51BA10A}">
-      <p15:sldGuideLst xmlns:p15="http://schemas.microsoft.com/office/powerpoint/2012/main"/>
+      <p15:sldGuideLst xmlns:p15="http://schemas.microsoft.com/office/powerpoint/2012/main" xmlns=""/>
     </p:ext>
   </p:extLst>
 </p:presentation>
@@ -5770,7 +5770,7 @@
                   </a:schemeClr>
                 </a:solidFill>
               </a:rPr>
-              <a:t>Exact matches, TF-IDF and Word2Vec</a:t>
+              <a:t>Exact matches, </a:t>
             </a:r>
             <a:r>
               <a:rPr lang="en-US" sz="2000" dirty="0" smtClean="0">
@@ -5780,8 +5780,13 @@
                   </a:schemeClr>
                 </a:solidFill>
               </a:rPr>
-              <a:t>)</a:t>
+              <a:t>TF-IDF, Word2Vec and word count)</a:t>
             </a:r>
+          </a:p>
+          <a:p>
+            <a:pPr>
+              <a:buNone/>
+            </a:pPr>
             <a:endParaRPr lang="en-US" sz="2000" dirty="0">
               <a:solidFill>
                 <a:schemeClr val="tx2">
@@ -6749,14 +6754,14 @@
           <p:nvPr>
             <p:extLst>
               <p:ext uri="{D42A27DB-BD31-4B8C-83A1-F6EECF244321}">
-                <p14:modId xmlns:p14="http://schemas.microsoft.com/office/powerpoint/2010/main" val="2618040302"/>
+                <p14:modId xmlns:p14="http://schemas.microsoft.com/office/powerpoint/2010/main" val="2224712882"/>
               </p:ext>
             </p:extLst>
           </p:nvPr>
         </p:nvGraphicFramePr>
         <p:xfrm>
-          <a:off x="841288" y="1631760"/>
-          <a:ext cx="4743966" cy="2317116"/>
+          <a:off x="995940" y="1389696"/>
+          <a:ext cx="4743966" cy="3117940"/>
         </p:xfrm>
         <a:graphic>
           <a:graphicData uri="http://schemas.openxmlformats.org/drawingml/2006/table">
@@ -6769,21 +6774,21 @@
                 <a:gridCol w="1932804">
                   <a:extLst>
                     <a:ext uri="{9D8B030D-6E8A-4147-A177-3AD203B41FA5}">
-                      <a16:colId xmlns:a16="http://schemas.microsoft.com/office/drawing/2014/main" xmlns="" val="20000"/>
+                      <a16:colId xmlns="" xmlns:a16="http://schemas.microsoft.com/office/drawing/2014/main" val="20000"/>
                     </a:ext>
                   </a:extLst>
                 </a:gridCol>
                 <a:gridCol w="1425458">
                   <a:extLst>
                     <a:ext uri="{9D8B030D-6E8A-4147-A177-3AD203B41FA5}">
-                      <a16:colId xmlns:a16="http://schemas.microsoft.com/office/drawing/2014/main" xmlns="" val="20001"/>
+                      <a16:colId xmlns="" xmlns:a16="http://schemas.microsoft.com/office/drawing/2014/main" val="20001"/>
                     </a:ext>
                   </a:extLst>
                 </a:gridCol>
                 <a:gridCol w="1385704">
                   <a:extLst>
                     <a:ext uri="{9D8B030D-6E8A-4147-A177-3AD203B41FA5}">
-                      <a16:colId xmlns:a16="http://schemas.microsoft.com/office/drawing/2014/main" xmlns="" val="20002"/>
+                      <a16:colId xmlns="" xmlns:a16="http://schemas.microsoft.com/office/drawing/2014/main" val="20002"/>
                     </a:ext>
                   </a:extLst>
                 </a:gridCol>
@@ -7063,7 +7068,7 @@
                 </a:tc>
                 <a:extLst>
                   <a:ext uri="{0D108BD9-81ED-4DB2-BD59-A6C34878D82A}">
-                    <a16:rowId xmlns:a16="http://schemas.microsoft.com/office/drawing/2014/main" xmlns="" val="10000"/>
+                    <a16:rowId xmlns="" xmlns:a16="http://schemas.microsoft.com/office/drawing/2014/main" val="10000"/>
                   </a:ext>
                 </a:extLst>
               </a:tr>
@@ -7307,7 +7312,7 @@
                 </a:tc>
                 <a:extLst>
                   <a:ext uri="{0D108BD9-81ED-4DB2-BD59-A6C34878D82A}">
-                    <a16:rowId xmlns:a16="http://schemas.microsoft.com/office/drawing/2014/main" xmlns="" val="10001"/>
+                    <a16:rowId xmlns="" xmlns:a16="http://schemas.microsoft.com/office/drawing/2014/main" val="10001"/>
                   </a:ext>
                 </a:extLst>
               </a:tr>
@@ -7551,7 +7556,7 @@
                 </a:tc>
                 <a:extLst>
                   <a:ext uri="{0D108BD9-81ED-4DB2-BD59-A6C34878D82A}">
-                    <a16:rowId xmlns:a16="http://schemas.microsoft.com/office/drawing/2014/main" xmlns="" val="1379631780"/>
+                    <a16:rowId xmlns="" xmlns:a16="http://schemas.microsoft.com/office/drawing/2014/main" val="1379631780"/>
                   </a:ext>
                 </a:extLst>
               </a:tr>
@@ -7795,7 +7800,7 @@
                 </a:tc>
                 <a:extLst>
                   <a:ext uri="{0D108BD9-81ED-4DB2-BD59-A6C34878D82A}">
-                    <a16:rowId xmlns:a16="http://schemas.microsoft.com/office/drawing/2014/main" xmlns="" val="2682683010"/>
+                    <a16:rowId xmlns="" xmlns:a16="http://schemas.microsoft.com/office/drawing/2014/main" val="2682683010"/>
                   </a:ext>
                 </a:extLst>
               </a:tr>
@@ -8039,7 +8044,7 @@
                 </a:tc>
                 <a:extLst>
                   <a:ext uri="{0D108BD9-81ED-4DB2-BD59-A6C34878D82A}">
-                    <a16:rowId xmlns:a16="http://schemas.microsoft.com/office/drawing/2014/main" xmlns="" val="3904289897"/>
+                    <a16:rowId xmlns="" xmlns:a16="http://schemas.microsoft.com/office/drawing/2014/main" val="3904289897"/>
                   </a:ext>
                 </a:extLst>
               </a:tr>
@@ -8298,9 +8303,487 @@
                 </a:tc>
                 <a:extLst>
                   <a:ext uri="{0D108BD9-81ED-4DB2-BD59-A6C34878D82A}">
-                    <a16:rowId xmlns:a16="http://schemas.microsoft.com/office/drawing/2014/main" xmlns="" val="2900340182"/>
+                    <a16:rowId xmlns="" xmlns:a16="http://schemas.microsoft.com/office/drawing/2014/main" val="2900340182"/>
                   </a:ext>
                 </a:extLst>
+              </a:tr>
+              <a:tr h="363064">
+                <a:tc>
+                  <a:txBody>
+                    <a:bodyPr/>
+                    <a:lstStyle/>
+                    <a:p>
+                      <a:pPr lvl="0" algn="r">
+                        <a:spcBef>
+                          <a:spcPts val="0"/>
+                        </a:spcBef>
+                        <a:buNone/>
+                      </a:pPr>
+                      <a:r>
+                        <a:rPr lang="en" sz="1200" dirty="0" smtClean="0">
+                          <a:solidFill>
+                            <a:schemeClr val="tx1">
+                              <a:lumMod val="85000"/>
+                              <a:lumOff val="15000"/>
+                            </a:schemeClr>
+                          </a:solidFill>
+                          <a:latin typeface="Karla"/>
+                          <a:ea typeface="Karla"/>
+                          <a:cs typeface="Karla"/>
+                          <a:sym typeface="Karla"/>
+                        </a:rPr>
+                        <a:t>Word count</a:t>
+                      </a:r>
+                      <a:endParaRPr lang="en" sz="1200" dirty="0">
+                        <a:solidFill>
+                          <a:schemeClr val="tx1">
+                            <a:lumMod val="85000"/>
+                            <a:lumOff val="15000"/>
+                          </a:schemeClr>
+                        </a:solidFill>
+                        <a:latin typeface="Karla"/>
+                        <a:ea typeface="Karla"/>
+                        <a:cs typeface="Karla"/>
+                        <a:sym typeface="Karla"/>
+                      </a:endParaRPr>
+                    </a:p>
+                  </a:txBody>
+                  <a:tcPr marL="36000" marR="36000" marT="36000" marB="36000" anchor="ctr">
+                    <a:lnL w="19050" cap="flat" cmpd="sng">
+                      <a:solidFill>
+                        <a:srgbClr val="F3F3F3"/>
+                      </a:solidFill>
+                      <a:prstDash val="solid"/>
+                      <a:round/>
+                      <a:headEnd type="none" w="med" len="med"/>
+                      <a:tailEnd type="none" w="med" len="med"/>
+                    </a:lnL>
+                    <a:lnR w="19050" cap="flat" cmpd="sng" algn="ctr">
+                      <a:solidFill>
+                        <a:srgbClr val="F3F3F3"/>
+                      </a:solidFill>
+                      <a:prstDash val="solid"/>
+                      <a:round/>
+                      <a:headEnd type="none" w="med" len="med"/>
+                      <a:tailEnd type="none" w="med" len="med"/>
+                    </a:lnR>
+                    <a:lnT w="19050" cap="flat" cmpd="sng">
+                      <a:solidFill>
+                        <a:srgbClr val="D9D9D9"/>
+                      </a:solidFill>
+                      <a:prstDash val="solid"/>
+                      <a:round/>
+                      <a:headEnd type="none" w="med" len="med"/>
+                      <a:tailEnd type="none" w="med" len="med"/>
+                    </a:lnT>
+                    <a:lnB w="19050" cap="flat" cmpd="sng" algn="ctr">
+                      <a:solidFill>
+                        <a:srgbClr val="D9D9D9"/>
+                      </a:solidFill>
+                      <a:prstDash val="solid"/>
+                      <a:round/>
+                      <a:headEnd type="none" w="med" len="med"/>
+                      <a:tailEnd type="none" w="med" len="med"/>
+                    </a:lnB>
+                  </a:tcPr>
+                </a:tc>
+                <a:tc>
+                  <a:txBody>
+                    <a:bodyPr/>
+                    <a:lstStyle/>
+                    <a:p>
+                      <a:pPr lvl="0" algn="ctr">
+                        <a:spcBef>
+                          <a:spcPts val="0"/>
+                        </a:spcBef>
+                        <a:buNone/>
+                      </a:pPr>
+                      <a:r>
+                        <a:rPr lang="en" sz="1100" b="1" dirty="0" smtClean="0">
+                          <a:solidFill>
+                            <a:schemeClr val="tx1">
+                              <a:lumMod val="85000"/>
+                              <a:lumOff val="15000"/>
+                            </a:schemeClr>
+                          </a:solidFill>
+                          <a:latin typeface="Karla"/>
+                          <a:ea typeface="Karla"/>
+                          <a:cs typeface="Karla"/>
+                          <a:sym typeface="Karla"/>
+                        </a:rPr>
+                        <a:t>?</a:t>
+                      </a:r>
+                      <a:endParaRPr lang="en" sz="1100" b="1" dirty="0">
+                        <a:solidFill>
+                          <a:schemeClr val="tx1">
+                            <a:lumMod val="85000"/>
+                            <a:lumOff val="15000"/>
+                          </a:schemeClr>
+                        </a:solidFill>
+                        <a:latin typeface="Karla"/>
+                        <a:ea typeface="Karla"/>
+                        <a:cs typeface="Karla"/>
+                        <a:sym typeface="Karla"/>
+                      </a:endParaRPr>
+                    </a:p>
+                  </a:txBody>
+                  <a:tcPr marL="36000" marR="36000" marT="36000" marB="36000" anchor="ctr">
+                    <a:lnL w="19050" cap="flat" cmpd="sng" algn="ctr">
+                      <a:solidFill>
+                        <a:srgbClr val="F3F3F3"/>
+                      </a:solidFill>
+                      <a:prstDash val="solid"/>
+                      <a:round/>
+                      <a:headEnd type="none" w="med" len="med"/>
+                      <a:tailEnd type="none" w="med" len="med"/>
+                    </a:lnL>
+                    <a:lnR w="19050" cap="flat" cmpd="sng" algn="ctr">
+                      <a:solidFill>
+                        <a:srgbClr val="F3F3F3"/>
+                      </a:solidFill>
+                      <a:prstDash val="solid"/>
+                      <a:round/>
+                      <a:headEnd type="none" w="med" len="med"/>
+                      <a:tailEnd type="none" w="med" len="med"/>
+                    </a:lnR>
+                    <a:lnT w="19050" cap="flat" cmpd="sng">
+                      <a:solidFill>
+                        <a:srgbClr val="D9D9D9"/>
+                      </a:solidFill>
+                      <a:prstDash val="solid"/>
+                      <a:round/>
+                      <a:headEnd type="none" w="med" len="med"/>
+                      <a:tailEnd type="none" w="med" len="med"/>
+                    </a:lnT>
+                    <a:lnB w="19050" cap="flat" cmpd="sng" algn="ctr">
+                      <a:solidFill>
+                        <a:srgbClr val="D9D9D9"/>
+                      </a:solidFill>
+                      <a:prstDash val="solid"/>
+                      <a:round/>
+                      <a:headEnd type="none" w="med" len="med"/>
+                      <a:tailEnd type="none" w="med" len="med"/>
+                    </a:lnB>
+                  </a:tcPr>
+                </a:tc>
+                <a:tc>
+                  <a:txBody>
+                    <a:bodyPr/>
+                    <a:lstStyle/>
+                    <a:p>
+                      <a:pPr lvl="0" algn="ctr">
+                        <a:spcBef>
+                          <a:spcPts val="0"/>
+                        </a:spcBef>
+                        <a:buNone/>
+                      </a:pPr>
+                      <a:r>
+                        <a:rPr lang="en" sz="1100" b="1" dirty="0" smtClean="0">
+                          <a:solidFill>
+                            <a:schemeClr val="tx1">
+                              <a:lumMod val="85000"/>
+                              <a:lumOff val="15000"/>
+                            </a:schemeClr>
+                          </a:solidFill>
+                          <a:latin typeface="Karla"/>
+                          <a:ea typeface="Karla"/>
+                          <a:cs typeface="Karla"/>
+                          <a:sym typeface="Karla"/>
+                        </a:rPr>
+                        <a:t>?</a:t>
+                      </a:r>
+                      <a:endParaRPr lang="en" sz="1100" b="1" dirty="0">
+                        <a:solidFill>
+                          <a:schemeClr val="tx1">
+                            <a:lumMod val="85000"/>
+                            <a:lumOff val="15000"/>
+                          </a:schemeClr>
+                        </a:solidFill>
+                        <a:latin typeface="Karla"/>
+                        <a:ea typeface="Karla"/>
+                        <a:cs typeface="Karla"/>
+                        <a:sym typeface="Karla"/>
+                      </a:endParaRPr>
+                    </a:p>
+                  </a:txBody>
+                  <a:tcPr marL="36000" marR="36000" marT="36000" marB="36000" anchor="ctr">
+                    <a:lnL w="19050" cap="flat" cmpd="sng" algn="ctr">
+                      <a:solidFill>
+                        <a:srgbClr val="F3F3F3"/>
+                      </a:solidFill>
+                      <a:prstDash val="solid"/>
+                      <a:round/>
+                      <a:headEnd type="none" w="med" len="med"/>
+                      <a:tailEnd type="none" w="med" len="med"/>
+                    </a:lnL>
+                    <a:lnR w="19050" cap="flat" cmpd="sng">
+                      <a:solidFill>
+                        <a:srgbClr val="F3F3F3"/>
+                      </a:solidFill>
+                      <a:prstDash val="solid"/>
+                      <a:round/>
+                      <a:headEnd type="none" w="med" len="med"/>
+                      <a:tailEnd type="none" w="med" len="med"/>
+                    </a:lnR>
+                    <a:lnT w="19050" cap="flat" cmpd="sng">
+                      <a:solidFill>
+                        <a:srgbClr val="D9D9D9"/>
+                      </a:solidFill>
+                      <a:prstDash val="solid"/>
+                      <a:round/>
+                      <a:headEnd type="none" w="med" len="med"/>
+                      <a:tailEnd type="none" w="med" len="med"/>
+                    </a:lnT>
+                    <a:lnB w="19050" cap="flat" cmpd="sng" algn="ctr">
+                      <a:solidFill>
+                        <a:srgbClr val="D9D9D9"/>
+                      </a:solidFill>
+                      <a:prstDash val="solid"/>
+                      <a:round/>
+                      <a:headEnd type="none" w="med" len="med"/>
+                      <a:tailEnd type="none" w="med" len="med"/>
+                    </a:lnB>
+                  </a:tcPr>
+                </a:tc>
+              </a:tr>
+              <a:tr h="363064">
+                <a:tc>
+                  <a:txBody>
+                    <a:bodyPr/>
+                    <a:lstStyle/>
+                    <a:p>
+                      <a:pPr lvl="0" algn="r">
+                        <a:spcBef>
+                          <a:spcPts val="0"/>
+                        </a:spcBef>
+                        <a:buNone/>
+                      </a:pPr>
+                      <a:r>
+                        <a:rPr lang="en" sz="1200" dirty="0" smtClean="0">
+                          <a:solidFill>
+                            <a:schemeClr val="tx1">
+                              <a:lumMod val="85000"/>
+                              <a:lumOff val="15000"/>
+                            </a:schemeClr>
+                          </a:solidFill>
+                          <a:latin typeface="Karla"/>
+                          <a:ea typeface="Karla"/>
+                          <a:cs typeface="Karla"/>
+                          <a:sym typeface="Karla"/>
+                        </a:rPr>
+                        <a:t>Word count, based on synonyms</a:t>
+                      </a:r>
+                      <a:endParaRPr lang="en" sz="1200" dirty="0">
+                        <a:solidFill>
+                          <a:schemeClr val="tx1">
+                            <a:lumMod val="85000"/>
+                            <a:lumOff val="15000"/>
+                          </a:schemeClr>
+                        </a:solidFill>
+                        <a:latin typeface="Karla"/>
+                        <a:ea typeface="Karla"/>
+                        <a:cs typeface="Karla"/>
+                        <a:sym typeface="Karla"/>
+                      </a:endParaRPr>
+                    </a:p>
+                  </a:txBody>
+                  <a:tcPr marL="36000" marR="36000" marT="36000" marB="36000" anchor="ctr">
+                    <a:lnL w="19050" cap="flat" cmpd="sng">
+                      <a:solidFill>
+                        <a:srgbClr val="F3F3F3"/>
+                      </a:solidFill>
+                      <a:prstDash val="solid"/>
+                      <a:round/>
+                      <a:headEnd type="none" w="med" len="med"/>
+                      <a:tailEnd type="none" w="med" len="med"/>
+                    </a:lnL>
+                    <a:lnR w="19050" cap="flat" cmpd="sng" algn="ctr">
+                      <a:solidFill>
+                        <a:srgbClr val="F3F3F3"/>
+                      </a:solidFill>
+                      <a:prstDash val="solid"/>
+                      <a:round/>
+                      <a:headEnd type="none" w="med" len="med"/>
+                      <a:tailEnd type="none" w="med" len="med"/>
+                    </a:lnR>
+                    <a:lnT w="19050" cap="flat" cmpd="sng">
+                      <a:solidFill>
+                        <a:srgbClr val="D9D9D9"/>
+                      </a:solidFill>
+                      <a:prstDash val="solid"/>
+                      <a:round/>
+                      <a:headEnd type="none" w="med" len="med"/>
+                      <a:tailEnd type="none" w="med" len="med"/>
+                    </a:lnT>
+                    <a:lnB w="19050" cap="flat" cmpd="sng" algn="ctr">
+                      <a:solidFill>
+                        <a:srgbClr val="D9D9D9"/>
+                      </a:solidFill>
+                      <a:prstDash val="solid"/>
+                      <a:round/>
+                      <a:headEnd type="none" w="med" len="med"/>
+                      <a:tailEnd type="none" w="med" len="med"/>
+                    </a:lnB>
+                  </a:tcPr>
+                </a:tc>
+                <a:tc>
+                  <a:txBody>
+                    <a:bodyPr/>
+                    <a:lstStyle/>
+                    <a:p>
+                      <a:pPr lvl="0" algn="ctr">
+                        <a:spcBef>
+                          <a:spcPts val="0"/>
+                        </a:spcBef>
+                        <a:buNone/>
+                      </a:pPr>
+                      <a:r>
+                        <a:rPr lang="en" sz="1100" b="1" dirty="0" smtClean="0">
+                          <a:solidFill>
+                            <a:schemeClr val="tx1">
+                              <a:lumMod val="85000"/>
+                              <a:lumOff val="15000"/>
+                            </a:schemeClr>
+                          </a:solidFill>
+                          <a:latin typeface="Karla"/>
+                          <a:ea typeface="Karla"/>
+                          <a:cs typeface="Karla"/>
+                          <a:sym typeface="Karla"/>
+                        </a:rPr>
+                        <a:t>?</a:t>
+                      </a:r>
+                      <a:endParaRPr lang="en" sz="1100" b="1" dirty="0">
+                        <a:solidFill>
+                          <a:schemeClr val="tx1">
+                            <a:lumMod val="85000"/>
+                            <a:lumOff val="15000"/>
+                          </a:schemeClr>
+                        </a:solidFill>
+                        <a:latin typeface="Karla"/>
+                        <a:ea typeface="Karla"/>
+                        <a:cs typeface="Karla"/>
+                        <a:sym typeface="Karla"/>
+                      </a:endParaRPr>
+                    </a:p>
+                  </a:txBody>
+                  <a:tcPr marL="36000" marR="36000" marT="36000" marB="36000" anchor="ctr">
+                    <a:lnL w="19050" cap="flat" cmpd="sng" algn="ctr">
+                      <a:solidFill>
+                        <a:srgbClr val="F3F3F3"/>
+                      </a:solidFill>
+                      <a:prstDash val="solid"/>
+                      <a:round/>
+                      <a:headEnd type="none" w="med" len="med"/>
+                      <a:tailEnd type="none" w="med" len="med"/>
+                    </a:lnL>
+                    <a:lnR w="19050" cap="flat" cmpd="sng" algn="ctr">
+                      <a:solidFill>
+                        <a:srgbClr val="F3F3F3"/>
+                      </a:solidFill>
+                      <a:prstDash val="solid"/>
+                      <a:round/>
+                      <a:headEnd type="none" w="med" len="med"/>
+                      <a:tailEnd type="none" w="med" len="med"/>
+                    </a:lnR>
+                    <a:lnT w="19050" cap="flat" cmpd="sng">
+                      <a:solidFill>
+                        <a:srgbClr val="D9D9D9"/>
+                      </a:solidFill>
+                      <a:prstDash val="solid"/>
+                      <a:round/>
+                      <a:headEnd type="none" w="med" len="med"/>
+                      <a:tailEnd type="none" w="med" len="med"/>
+                    </a:lnT>
+                    <a:lnB w="19050" cap="flat" cmpd="sng" algn="ctr">
+                      <a:solidFill>
+                        <a:srgbClr val="D9D9D9"/>
+                      </a:solidFill>
+                      <a:prstDash val="solid"/>
+                      <a:round/>
+                      <a:headEnd type="none" w="med" len="med"/>
+                      <a:tailEnd type="none" w="med" len="med"/>
+                    </a:lnB>
+                  </a:tcPr>
+                </a:tc>
+                <a:tc>
+                  <a:txBody>
+                    <a:bodyPr/>
+                    <a:lstStyle/>
+                    <a:p>
+                      <a:pPr lvl="0" algn="ctr">
+                        <a:spcBef>
+                          <a:spcPts val="0"/>
+                        </a:spcBef>
+                        <a:buNone/>
+                      </a:pPr>
+                      <a:r>
+                        <a:rPr lang="en" sz="1100" b="1" smtClean="0">
+                          <a:solidFill>
+                            <a:schemeClr val="tx1">
+                              <a:lumMod val="85000"/>
+                              <a:lumOff val="15000"/>
+                            </a:schemeClr>
+                          </a:solidFill>
+                          <a:latin typeface="Karla"/>
+                          <a:ea typeface="Karla"/>
+                          <a:cs typeface="Karla"/>
+                          <a:sym typeface="Karla"/>
+                        </a:rPr>
+                        <a:t>?</a:t>
+                      </a:r>
+                      <a:endParaRPr lang="en" sz="1100" b="1" dirty="0">
+                        <a:solidFill>
+                          <a:schemeClr val="tx1">
+                            <a:lumMod val="85000"/>
+                            <a:lumOff val="15000"/>
+                          </a:schemeClr>
+                        </a:solidFill>
+                        <a:latin typeface="Karla"/>
+                        <a:ea typeface="Karla"/>
+                        <a:cs typeface="Karla"/>
+                        <a:sym typeface="Karla"/>
+                      </a:endParaRPr>
+                    </a:p>
+                  </a:txBody>
+                  <a:tcPr marL="36000" marR="36000" marT="36000" marB="36000" anchor="ctr">
+                    <a:lnL w="19050" cap="flat" cmpd="sng" algn="ctr">
+                      <a:solidFill>
+                        <a:srgbClr val="F3F3F3"/>
+                      </a:solidFill>
+                      <a:prstDash val="solid"/>
+                      <a:round/>
+                      <a:headEnd type="none" w="med" len="med"/>
+                      <a:tailEnd type="none" w="med" len="med"/>
+                    </a:lnL>
+                    <a:lnR w="19050" cap="flat" cmpd="sng">
+                      <a:solidFill>
+                        <a:srgbClr val="F3F3F3"/>
+                      </a:solidFill>
+                      <a:prstDash val="solid"/>
+                      <a:round/>
+                      <a:headEnd type="none" w="med" len="med"/>
+                      <a:tailEnd type="none" w="med" len="med"/>
+                    </a:lnR>
+                    <a:lnT w="19050" cap="flat" cmpd="sng">
+                      <a:solidFill>
+                        <a:srgbClr val="D9D9D9"/>
+                      </a:solidFill>
+                      <a:prstDash val="solid"/>
+                      <a:round/>
+                      <a:headEnd type="none" w="med" len="med"/>
+                      <a:tailEnd type="none" w="med" len="med"/>
+                    </a:lnT>
+                    <a:lnB w="19050" cap="flat" cmpd="sng" algn="ctr">
+                      <a:solidFill>
+                        <a:srgbClr val="D9D9D9"/>
+                      </a:solidFill>
+                      <a:prstDash val="solid"/>
+                      <a:round/>
+                      <a:headEnd type="none" w="med" len="med"/>
+                      <a:tailEnd type="none" w="med" len="med"/>
+                    </a:lnB>
+                  </a:tcPr>
+                </a:tc>
               </a:tr>
             </a:tbl>
           </a:graphicData>
@@ -12167,7 +12650,30 @@
                   </a:schemeClr>
                 </a:solidFill>
               </a:rPr>
-              <a:t>relative training data</a:t>
+              <a:t>relative training </a:t>
+            </a:r>
+            <a:r>
+              <a:rPr lang="en-US" sz="2000" dirty="0" smtClean="0">
+                <a:solidFill>
+                  <a:schemeClr val="tx2">
+                    <a:lumMod val="50000"/>
+                  </a:schemeClr>
+                </a:solidFill>
+              </a:rPr>
+              <a:t>data</a:t>
+            </a:r>
+          </a:p>
+          <a:p>
+            <a:pPr indent="-228600"/>
+            <a:r>
+              <a:rPr lang="en-US" sz="2000" dirty="0" smtClean="0">
+                <a:solidFill>
+                  <a:schemeClr val="tx2">
+                    <a:lumMod val="50000"/>
+                  </a:schemeClr>
+                </a:solidFill>
+              </a:rPr>
+              <a:t>Deep learning approach</a:t>
             </a:r>
             <a:endParaRPr lang="en-US" sz="2000" dirty="0">
               <a:solidFill>
@@ -12662,8 +13168,46 @@
                     <a:lumOff val="35000"/>
                   </a:schemeClr>
                 </a:solidFill>
+                <a:hlinkClick r:id="rId3"/>
               </a:rPr>
-              <a:t>http://dbpedia.org/</a:t>
+              <a:t>http://dbpedia.org</a:t>
+            </a:r>
+            <a:r>
+              <a:rPr lang="en-US" sz="1200" dirty="0" smtClean="0">
+                <a:solidFill>
+                  <a:schemeClr val="tx1">
+                    <a:lumMod val="65000"/>
+                    <a:lumOff val="35000"/>
+                  </a:schemeClr>
+                </a:solidFill>
+                <a:hlinkClick r:id="rId3"/>
+              </a:rPr>
+              <a:t>/</a:t>
+            </a:r>
+            <a:endParaRPr lang="en-US" sz="1200" dirty="0" smtClean="0">
+              <a:solidFill>
+                <a:schemeClr val="tx1">
+                  <a:lumMod val="65000"/>
+                  <a:lumOff val="35000"/>
+                </a:schemeClr>
+              </a:solidFill>
+            </a:endParaRPr>
+          </a:p>
+          <a:p>
+            <a:pPr marL="228600" lvl="0" indent="-228600">
+              <a:buFont typeface="+mj-lt"/>
+              <a:buAutoNum type="arabicPeriod"/>
+            </a:pPr>
+            <a:r>
+              <a:rPr lang="en-US" sz="1200" dirty="0">
+                <a:solidFill>
+                  <a:schemeClr val="tx1">
+                    <a:lumMod val="65000"/>
+                    <a:lumOff val="35000"/>
+                  </a:schemeClr>
+                </a:solidFill>
+              </a:rPr>
+              <a:t>http://www.thesaurus.com/</a:t>
             </a:r>
             <a:endParaRPr lang="en-US" sz="1200" dirty="0">
               <a:solidFill>
@@ -18044,7 +18588,7 @@
                   </a:schemeClr>
                 </a:solidFill>
               </a:rPr>
-              <a:t>DBpedia</a:t>
+              <a:t>Dbpedia</a:t>
             </a:r>
             <a:endParaRPr lang="en-US" sz="2000" dirty="0" smtClean="0">
               <a:solidFill>
@@ -18110,20 +18654,10 @@
                   </a:schemeClr>
                 </a:solidFill>
               </a:rPr>
-              <a:t>Found information </a:t>
+              <a:t>Found information for </a:t>
             </a:r>
             <a:r>
-              <a:rPr lang="en-US" sz="2000" smtClean="0">
-                <a:solidFill>
-                  <a:schemeClr val="tx2">
-                    <a:lumMod val="50000"/>
-                  </a:schemeClr>
-                </a:solidFill>
-              </a:rPr>
-              <a:t>for </a:t>
-            </a:r>
-            <a:r>
-              <a:rPr lang="en-US" sz="2000" b="1" smtClean="0">
+              <a:rPr lang="en-US" sz="2000" b="1" dirty="0" smtClean="0">
                 <a:solidFill>
                   <a:schemeClr val="tx2">
                     <a:lumMod val="50000"/>
@@ -18133,7 +18667,7 @@
               <a:t>385 314</a:t>
             </a:r>
             <a:r>
-              <a:rPr lang="en-US" sz="2000" smtClean="0">
+              <a:rPr lang="en-US" sz="2000" dirty="0" smtClean="0">
                 <a:solidFill>
                   <a:schemeClr val="tx2">
                     <a:lumMod val="50000"/>
@@ -19744,8 +20278,8 @@
         </p:nvSpPr>
         <p:spPr>
           <a:xfrm>
-            <a:off x="797749" y="1835754"/>
-            <a:ext cx="5911275" cy="3198583"/>
+            <a:off x="797749" y="1385246"/>
+            <a:ext cx="6288851" cy="3583442"/>
           </a:xfrm>
           <a:prstGeom prst="rect">
             <a:avLst/>
@@ -19764,15 +20298,7 @@
                   <a:srgbClr val="D81C5C"/>
                 </a:solidFill>
               </a:rPr>
-              <a:t>Missing </a:t>
-            </a:r>
-            <a:r>
-              <a:rPr lang="en-US" sz="2000" b="1" dirty="0" smtClean="0">
-                <a:solidFill>
-                  <a:srgbClr val="D81C5C"/>
-                </a:solidFill>
-              </a:rPr>
-              <a:t>person file</a:t>
+              <a:t>Missing person file</a:t>
             </a:r>
             <a:r>
               <a:rPr lang="en-US" sz="2000" dirty="0" smtClean="0">
@@ -19887,17 +20413,7 @@
                   </a:schemeClr>
                 </a:solidFill>
               </a:rPr>
-              <a:t>– with and </a:t>
-            </a:r>
-            <a:r>
-              <a:rPr lang="en-US" sz="2000" smtClean="0">
-                <a:solidFill>
-                  <a:schemeClr val="tx2">
-                    <a:lumMod val="50000"/>
-                  </a:schemeClr>
-                </a:solidFill>
-              </a:rPr>
-              <a:t>without synonyms</a:t>
+              <a:t>– with and without synonyms</a:t>
             </a:r>
             <a:endParaRPr lang="en-US" sz="2000" b="1" dirty="0">
               <a:solidFill>
@@ -19991,9 +20507,40 @@
                   </a:schemeClr>
                 </a:solidFill>
               </a:rPr>
-              <a:t>positive persons for each term</a:t>
+              <a:t>positive persons for each </a:t>
             </a:r>
-            <a:endParaRPr lang="en-US" sz="2000" dirty="0">
+            <a:r>
+              <a:rPr lang="en-US" sz="2000" dirty="0" smtClean="0">
+                <a:solidFill>
+                  <a:schemeClr val="tx2">
+                    <a:lumMod val="50000"/>
+                  </a:schemeClr>
+                </a:solidFill>
+              </a:rPr>
+              <a:t>term</a:t>
+            </a:r>
+          </a:p>
+          <a:p>
+            <a:pPr indent="-228600"/>
+            <a:r>
+              <a:rPr lang="en-US" sz="2000" b="1" dirty="0" smtClean="0">
+                <a:solidFill>
+                  <a:srgbClr val="D81C5C"/>
+                </a:solidFill>
+              </a:rPr>
+              <a:t>Word Count</a:t>
+            </a:r>
+            <a:r>
+              <a:rPr lang="en-US" sz="2000" dirty="0" smtClean="0">
+                <a:solidFill>
+                  <a:schemeClr val="tx2">
+                    <a:lumMod val="50000"/>
+                  </a:schemeClr>
+                </a:solidFill>
+              </a:rPr>
+              <a:t> – getting all professions, and setting score, based on the order of appearance</a:t>
+            </a:r>
+            <a:endParaRPr lang="bg-BG" sz="2000" dirty="0" smtClean="0">
               <a:solidFill>
                 <a:schemeClr val="tx2">
                   <a:lumMod val="50000"/>
@@ -20002,8 +20549,46 @@
             </a:endParaRPr>
           </a:p>
           <a:p>
-            <a:pPr marL="457200" lvl="2" indent="-228600"/>
-            <a:endParaRPr lang="en" sz="1800" dirty="0">
+            <a:pPr indent="-228600"/>
+            <a:r>
+              <a:rPr lang="en-US" sz="2000" b="1" dirty="0" smtClean="0">
+                <a:solidFill>
+                  <a:srgbClr val="D81C5C"/>
+                </a:solidFill>
+              </a:rPr>
+              <a:t>Word count, based on synonyms </a:t>
+            </a:r>
+            <a:r>
+              <a:rPr lang="en-US" sz="1800" dirty="0" smtClean="0">
+                <a:solidFill>
+                  <a:schemeClr val="tx2">
+                    <a:lumMod val="50000"/>
+                  </a:schemeClr>
+                </a:solidFill>
+              </a:rPr>
+              <a:t>– profession synonyms have </a:t>
+            </a:r>
+            <a:r>
+              <a:rPr lang="en-US" sz="1800" dirty="0">
+                <a:solidFill>
+                  <a:schemeClr val="tx2">
+                    <a:lumMod val="50000"/>
+                  </a:schemeClr>
+                </a:solidFill>
+              </a:rPr>
+              <a:t>been retrieved from </a:t>
+            </a:r>
+            <a:r>
+              <a:rPr lang="en-US" sz="1800" b="1" i="1" dirty="0">
+                <a:solidFill>
+                  <a:schemeClr val="tx2">
+                    <a:lumMod val="50000"/>
+                  </a:schemeClr>
+                </a:solidFill>
+              </a:rPr>
+              <a:t>thesaurus.com</a:t>
+            </a:r>
+            <a:endParaRPr lang="bg-BG" sz="1800" b="1" i="1" dirty="0">
               <a:solidFill>
                 <a:schemeClr val="tx2">
                   <a:lumMod val="50000"/>

</xml_diff>